<commit_message>
created subfolder for pictures and ignored .pyc
</commit_message>
<xml_diff>
--- a/files/ppt_presentations/ppt_demo_2.pptx
+++ b/files/ppt_presentations/ppt_demo_2.pptx
@@ -37033,7 +37033,7 @@
 </file>
 
 <file path=customXml/itemProps1.xml><?xml version="1.0" encoding="utf-8"?>
-<ds:datastoreItem xmlns:ds="http://schemas.openxmlformats.org/officeDocument/2006/customXml" ds:itemID="{2611C6C5-73A8-4088-8E8F-45AC80A93639}">
+<ds:datastoreItem xmlns:ds="http://schemas.openxmlformats.org/officeDocument/2006/customXml" ds:itemID="{25B0A9D5-AA86-40E5-8BB9-BF6B6793A753}">
   <ds:schemaRefs>
     <ds:schemaRef ds:uri="http://schemas.microsoft.com/VisualStudio/2011/storyboarding/control"/>
   </ds:schemaRefs>
@@ -37041,7 +37041,7 @@
 </file>
 
 <file path=customXml/itemProps10.xml><?xml version="1.0" encoding="utf-8"?>
-<ds:datastoreItem xmlns:ds="http://schemas.openxmlformats.org/officeDocument/2006/customXml" ds:itemID="{C4C77668-3C09-4800-9078-32A63FDB8878}">
+<ds:datastoreItem xmlns:ds="http://schemas.openxmlformats.org/officeDocument/2006/customXml" ds:itemID="{0103A532-5B2C-4425-9F2A-7F4721A16C4C}">
   <ds:schemaRefs>
     <ds:schemaRef ds:uri="http://schemas.microsoft.com/VisualStudio/2011/storyboarding/control"/>
   </ds:schemaRefs>
@@ -37057,7 +37057,7 @@
 </file>
 
 <file path=customXml/itemProps3.xml><?xml version="1.0" encoding="utf-8"?>
-<ds:datastoreItem xmlns:ds="http://schemas.openxmlformats.org/officeDocument/2006/customXml" ds:itemID="{0103A532-5B2C-4425-9F2A-7F4721A16C4C}">
+<ds:datastoreItem xmlns:ds="http://schemas.openxmlformats.org/officeDocument/2006/customXml" ds:itemID="{2611C6C5-73A8-4088-8E8F-45AC80A93639}">
   <ds:schemaRefs>
     <ds:schemaRef ds:uri="http://schemas.microsoft.com/VisualStudio/2011/storyboarding/control"/>
   </ds:schemaRefs>
@@ -37065,7 +37065,7 @@
 </file>
 
 <file path=customXml/itemProps4.xml><?xml version="1.0" encoding="utf-8"?>
-<ds:datastoreItem xmlns:ds="http://schemas.openxmlformats.org/officeDocument/2006/customXml" ds:itemID="{C617D7A1-438A-4842-B3E3-9908A6EB6D2C}">
+<ds:datastoreItem xmlns:ds="http://schemas.openxmlformats.org/officeDocument/2006/customXml" ds:itemID="{1CFCFB3A-1124-4BB9-AF75-CF97631426FE}">
   <ds:schemaRefs>
     <ds:schemaRef ds:uri="http://schemas.microsoft.com/VisualStudio/2011/storyboarding/control"/>
   </ds:schemaRefs>
@@ -37081,7 +37081,7 @@
 </file>
 
 <file path=customXml/itemProps6.xml><?xml version="1.0" encoding="utf-8"?>
-<ds:datastoreItem xmlns:ds="http://schemas.openxmlformats.org/officeDocument/2006/customXml" ds:itemID="{1CFCFB3A-1124-4BB9-AF75-CF97631426FE}">
+<ds:datastoreItem xmlns:ds="http://schemas.openxmlformats.org/officeDocument/2006/customXml" ds:itemID="{C4C77668-3C09-4800-9078-32A63FDB8878}">
   <ds:schemaRefs>
     <ds:schemaRef ds:uri="http://schemas.microsoft.com/VisualStudio/2011/storyboarding/control"/>
   </ds:schemaRefs>
@@ -37089,7 +37089,7 @@
 </file>
 
 <file path=customXml/itemProps7.xml><?xml version="1.0" encoding="utf-8"?>
-<ds:datastoreItem xmlns:ds="http://schemas.openxmlformats.org/officeDocument/2006/customXml" ds:itemID="{25B0A9D5-AA86-40E5-8BB9-BF6B6793A753}">
+<ds:datastoreItem xmlns:ds="http://schemas.openxmlformats.org/officeDocument/2006/customXml" ds:itemID="{C617D7A1-438A-4842-B3E3-9908A6EB6D2C}">
   <ds:schemaRefs>
     <ds:schemaRef ds:uri="http://schemas.microsoft.com/VisualStudio/2011/storyboarding/control"/>
   </ds:schemaRefs>
@@ -37097,7 +37097,7 @@
 </file>
 
 <file path=customXml/itemProps8.xml><?xml version="1.0" encoding="utf-8"?>
-<ds:datastoreItem xmlns:ds="http://schemas.openxmlformats.org/officeDocument/2006/customXml" ds:itemID="{A3DE4E40-43A6-4881-AA8B-24AE61AEFE20}">
+<ds:datastoreItem xmlns:ds="http://schemas.openxmlformats.org/officeDocument/2006/customXml" ds:itemID="{834A27C6-F506-436C-BE80-EBD990020008}">
   <ds:schemaRefs>
     <ds:schemaRef ds:uri="http://schemas.microsoft.com/VisualStudio/2011/storyboarding/control"/>
   </ds:schemaRefs>
@@ -37105,7 +37105,7 @@
 </file>
 
 <file path=customXml/itemProps9.xml><?xml version="1.0" encoding="utf-8"?>
-<ds:datastoreItem xmlns:ds="http://schemas.openxmlformats.org/officeDocument/2006/customXml" ds:itemID="{834A27C6-F506-436C-BE80-EBD990020008}">
+<ds:datastoreItem xmlns:ds="http://schemas.openxmlformats.org/officeDocument/2006/customXml" ds:itemID="{A3DE4E40-43A6-4881-AA8B-24AE61AEFE20}">
   <ds:schemaRefs>
     <ds:schemaRef ds:uri="http://schemas.microsoft.com/VisualStudio/2011/storyboarding/control"/>
   </ds:schemaRefs>

</xml_diff>